<commit_message>
Update slides 9 and 10.pptx to include recent content revisions, enhancing the quality and relevance of lecture materials.
</commit_message>
<xml_diff>
--- a/lectures/slides_9.pptx
+++ b/lectures/slides_9.pptx
@@ -5,7 +5,7 @@
     <p:sldMasterId id="2147483659" r:id="rId1"/>
   </p:sldMasterIdLst>
   <p:notesMasterIdLst>
-    <p:notesMasterId r:id="rId119"/>
+    <p:notesMasterId r:id="rId118"/>
   </p:notesMasterIdLst>
   <p:sldIdLst>
     <p:sldId id="256" r:id="rId2"/>
@@ -124,7 +124,6 @@
     <p:sldId id="369" r:id="rId115"/>
     <p:sldId id="370" r:id="rId116"/>
     <p:sldId id="371" r:id="rId117"/>
-    <p:sldId id="372" r:id="rId118"/>
   </p:sldIdLst>
   <p:sldSz cx="9144000" cy="5143500" type="screen16x9"/>
   <p:notesSz cx="6858000" cy="9144000"/>
@@ -3076,7 +3075,7 @@
         </p:nvSpPr>
         <p:spPr>
           <a:xfrm>
-            <a:off x="381300" y="685800"/>
+            <a:off x="381000" y="685800"/>
             <a:ext cx="6096000" cy="3429000"/>
           </a:xfrm>
           <a:custGeom>
@@ -3144,123 +3143,6 @@
                 <a:schemeClr val="dk1"/>
               </a:solidFill>
             </a:endParaRPr>
-          </a:p>
-        </p:txBody>
-      </p:sp>
-    </p:spTree>
-  </p:cSld>
-  <p:clrMapOvr>
-    <a:masterClrMapping/>
-  </p:clrMapOvr>
-</p:notes>
-</file>
-
-<file path=ppt/notesSlides/notesSlide117.xml><?xml version="1.0" encoding="utf-8"?>
-<p:notes xmlns:a="http://schemas.openxmlformats.org/drawingml/2006/main" xmlns:r="http://schemas.openxmlformats.org/officeDocument/2006/relationships" xmlns:p="http://schemas.openxmlformats.org/presentationml/2006/main" showMasterSp="0" showMasterPhAnim="0">
-  <p:cSld>
-    <p:spTree>
-      <p:nvGrpSpPr>
-        <p:cNvPr id="1" name="Shape 686"/>
-        <p:cNvGrpSpPr/>
-        <p:nvPr/>
-      </p:nvGrpSpPr>
-      <p:grpSpPr>
-        <a:xfrm>
-          <a:off x="0" y="0"/>
-          <a:ext cx="0" cy="0"/>
-          <a:chOff x="0" y="0"/>
-          <a:chExt cx="0" cy="0"/>
-        </a:xfrm>
-      </p:grpSpPr>
-      <p:sp>
-        <p:nvSpPr>
-          <p:cNvPr id="687" name="Google Shape;687;g297e0f1d4d2_11_0:notes"/>
-          <p:cNvSpPr>
-            <a:spLocks noGrp="1" noRot="1" noChangeAspect="1"/>
-          </p:cNvSpPr>
-          <p:nvPr>
-            <p:ph type="sldImg" idx="2"/>
-          </p:nvPr>
-        </p:nvSpPr>
-        <p:spPr>
-          <a:xfrm>
-            <a:off x="381300" y="685800"/>
-            <a:ext cx="6096000" cy="3429000"/>
-          </a:xfrm>
-          <a:custGeom>
-            <a:avLst/>
-            <a:gdLst/>
-            <a:ahLst/>
-            <a:cxnLst/>
-            <a:rect l="l" t="t" r="r" b="b"/>
-            <a:pathLst>
-              <a:path w="120000" h="120000" extrusionOk="0">
-                <a:moveTo>
-                  <a:pt x="0" y="0"/>
-                </a:moveTo>
-                <a:lnTo>
-                  <a:pt x="120000" y="0"/>
-                </a:lnTo>
-                <a:lnTo>
-                  <a:pt x="120000" y="120000"/>
-                </a:lnTo>
-                <a:lnTo>
-                  <a:pt x="0" y="120000"/>
-                </a:lnTo>
-                <a:close/>
-              </a:path>
-            </a:pathLst>
-          </a:custGeom>
-        </p:spPr>
-      </p:sp>
-      <p:sp>
-        <p:nvSpPr>
-          <p:cNvPr id="688" name="Google Shape;688;g297e0f1d4d2_11_0:notes"/>
-          <p:cNvSpPr txBox="1">
-            <a:spLocks noGrp="1"/>
-          </p:cNvSpPr>
-          <p:nvPr>
-            <p:ph type="body" idx="1"/>
-          </p:nvPr>
-        </p:nvSpPr>
-        <p:spPr>
-          <a:xfrm>
-            <a:off x="685800" y="4343400"/>
-            <a:ext cx="5486400" cy="4114800"/>
-          </a:xfrm>
-          <a:prstGeom prst="rect">
-            <a:avLst/>
-          </a:prstGeom>
-        </p:spPr>
-        <p:txBody>
-          <a:bodyPr spcFirstLastPara="1" wrap="square" lIns="91425" tIns="91425" rIns="91425" bIns="91425" anchor="t" anchorCtr="0">
-            <a:noAutofit/>
-          </a:bodyPr>
-          <a:lstStyle/>
-          <a:p>
-            <a:pPr marL="0" lvl="0" indent="0" algn="l" rtl="0">
-              <a:spcBef>
-                <a:spcPts val="0"/>
-              </a:spcBef>
-              <a:spcAft>
-                <a:spcPts val="0"/>
-              </a:spcAft>
-              <a:buNone/>
-            </a:pPr>
-            <a:r>
-              <a:rPr lang="en" u="sng">
-                <a:solidFill>
-                  <a:schemeClr val="hlink"/>
-                </a:solidFill>
-                <a:hlinkClick r:id="rId3"/>
-              </a:rPr>
-              <a:t>https://www.youtube.com/watch?v=mofAEZ6fWLc</a:t>
-            </a:r>
-            <a:r>
-              <a:rPr lang="en"/>
-              <a:t> </a:t>
-            </a:r>
-            <a:endParaRPr/>
           </a:p>
         </p:txBody>
       </p:sp>
@@ -3951,7 +3833,7 @@
         </p:nvSpPr>
         <p:spPr>
           <a:xfrm>
-            <a:off x="381300" y="685800"/>
+            <a:off x="381000" y="685800"/>
             <a:ext cx="6096000" cy="3429000"/>
           </a:xfrm>
           <a:custGeom>
@@ -4055,7 +3937,7 @@
         </p:nvSpPr>
         <p:spPr>
           <a:xfrm>
-            <a:off x="381300" y="685800"/>
+            <a:off x="381000" y="685800"/>
             <a:ext cx="6096000" cy="3429000"/>
           </a:xfrm>
           <a:custGeom>
@@ -4159,7 +4041,7 @@
         </p:nvSpPr>
         <p:spPr>
           <a:xfrm>
-            <a:off x="381300" y="685800"/>
+            <a:off x="381000" y="685800"/>
             <a:ext cx="6096000" cy="3429000"/>
           </a:xfrm>
           <a:custGeom>
@@ -24022,177 +23904,279 @@
           <a:chExt cx="0" cy="0"/>
         </a:xfrm>
       </p:grpSpPr>
-      <p:pic>
-        <p:nvPicPr>
-          <p:cNvPr id="685" name="Google Shape;685;p128"/>
-          <p:cNvPicPr preferRelativeResize="0"/>
+      <p:sp>
+        <p:nvSpPr>
+          <p:cNvPr id="2" name="TextBox 1">
+            <a:extLst>
+              <a:ext uri="{FF2B5EF4-FFF2-40B4-BE49-F238E27FC236}">
+                <a16:creationId xmlns:a16="http://schemas.microsoft.com/office/drawing/2014/main" id="{50457470-869F-3131-BECA-F5A378ABE6C9}"/>
+              </a:ext>
+            </a:extLst>
+          </p:cNvPr>
+          <p:cNvSpPr txBox="1"/>
           <p:nvPr/>
-        </p:nvPicPr>
-        <p:blipFill>
-          <a:blip r:embed="rId3">
-            <a:alphaModFix/>
-          </a:blip>
-          <a:stretch>
-            <a:fillRect/>
-          </a:stretch>
-        </p:blipFill>
+        </p:nvSpPr>
         <p:spPr>
           <a:xfrm>
-            <a:off x="-12" y="0"/>
-            <a:ext cx="9144018" cy="5143501"/>
+            <a:off x="921001" y="2110085"/>
+            <a:ext cx="7301999" cy="923330"/>
           </a:xfrm>
           <a:prstGeom prst="rect">
             <a:avLst/>
           </a:prstGeom>
           <a:noFill/>
-          <a:ln>
-            <a:noFill/>
-          </a:ln>
         </p:spPr>
-      </p:pic>
+        <p:txBody>
+          <a:bodyPr wrap="none" rtlCol="0">
+            <a:spAutoFit/>
+          </a:bodyPr>
+          <a:lstStyle>
+            <a:defPPr marR="0" lvl="0" algn="l" rtl="0">
+              <a:lnSpc>
+                <a:spcPct val="100000"/>
+              </a:lnSpc>
+              <a:spcBef>
+                <a:spcPts val="0"/>
+              </a:spcBef>
+              <a:spcAft>
+                <a:spcPts val="0"/>
+              </a:spcAft>
+              <a:defRPr/>
+            </a:defPPr>
+            <a:lvl1pPr marR="0" lvl="0" algn="l" rtl="0">
+              <a:lnSpc>
+                <a:spcPct val="100000"/>
+              </a:lnSpc>
+              <a:spcBef>
+                <a:spcPts val="0"/>
+              </a:spcBef>
+              <a:spcAft>
+                <a:spcPts val="0"/>
+              </a:spcAft>
+              <a:buClr>
+                <a:srgbClr val="000000"/>
+              </a:buClr>
+              <a:buFont typeface="Arial"/>
+              <a:defRPr sz="1400" b="0" i="0" u="none" strike="noStrike" cap="none">
+                <a:solidFill>
+                  <a:srgbClr val="000000"/>
+                </a:solidFill>
+                <a:latin typeface="Arial"/>
+                <a:ea typeface="Arial"/>
+                <a:cs typeface="Arial"/>
+                <a:sym typeface="Arial"/>
+              </a:defRPr>
+            </a:lvl1pPr>
+            <a:lvl2pPr marR="0" lvl="1" algn="l" rtl="0">
+              <a:lnSpc>
+                <a:spcPct val="100000"/>
+              </a:lnSpc>
+              <a:spcBef>
+                <a:spcPts val="0"/>
+              </a:spcBef>
+              <a:spcAft>
+                <a:spcPts val="0"/>
+              </a:spcAft>
+              <a:buClr>
+                <a:srgbClr val="000000"/>
+              </a:buClr>
+              <a:buFont typeface="Arial"/>
+              <a:defRPr sz="1400" b="0" i="0" u="none" strike="noStrike" cap="none">
+                <a:solidFill>
+                  <a:srgbClr val="000000"/>
+                </a:solidFill>
+                <a:latin typeface="Arial"/>
+                <a:ea typeface="Arial"/>
+                <a:cs typeface="Arial"/>
+                <a:sym typeface="Arial"/>
+              </a:defRPr>
+            </a:lvl2pPr>
+            <a:lvl3pPr marR="0" lvl="2" algn="l" rtl="0">
+              <a:lnSpc>
+                <a:spcPct val="100000"/>
+              </a:lnSpc>
+              <a:spcBef>
+                <a:spcPts val="0"/>
+              </a:spcBef>
+              <a:spcAft>
+                <a:spcPts val="0"/>
+              </a:spcAft>
+              <a:buClr>
+                <a:srgbClr val="000000"/>
+              </a:buClr>
+              <a:buFont typeface="Arial"/>
+              <a:defRPr sz="1400" b="0" i="0" u="none" strike="noStrike" cap="none">
+                <a:solidFill>
+                  <a:srgbClr val="000000"/>
+                </a:solidFill>
+                <a:latin typeface="Arial"/>
+                <a:ea typeface="Arial"/>
+                <a:cs typeface="Arial"/>
+                <a:sym typeface="Arial"/>
+              </a:defRPr>
+            </a:lvl3pPr>
+            <a:lvl4pPr marR="0" lvl="3" algn="l" rtl="0">
+              <a:lnSpc>
+                <a:spcPct val="100000"/>
+              </a:lnSpc>
+              <a:spcBef>
+                <a:spcPts val="0"/>
+              </a:spcBef>
+              <a:spcAft>
+                <a:spcPts val="0"/>
+              </a:spcAft>
+              <a:buClr>
+                <a:srgbClr val="000000"/>
+              </a:buClr>
+              <a:buFont typeface="Arial"/>
+              <a:defRPr sz="1400" b="0" i="0" u="none" strike="noStrike" cap="none">
+                <a:solidFill>
+                  <a:srgbClr val="000000"/>
+                </a:solidFill>
+                <a:latin typeface="Arial"/>
+                <a:ea typeface="Arial"/>
+                <a:cs typeface="Arial"/>
+                <a:sym typeface="Arial"/>
+              </a:defRPr>
+            </a:lvl4pPr>
+            <a:lvl5pPr marR="0" lvl="4" algn="l" rtl="0">
+              <a:lnSpc>
+                <a:spcPct val="100000"/>
+              </a:lnSpc>
+              <a:spcBef>
+                <a:spcPts val="0"/>
+              </a:spcBef>
+              <a:spcAft>
+                <a:spcPts val="0"/>
+              </a:spcAft>
+              <a:buClr>
+                <a:srgbClr val="000000"/>
+              </a:buClr>
+              <a:buFont typeface="Arial"/>
+              <a:defRPr sz="1400" b="0" i="0" u="none" strike="noStrike" cap="none">
+                <a:solidFill>
+                  <a:srgbClr val="000000"/>
+                </a:solidFill>
+                <a:latin typeface="Arial"/>
+                <a:ea typeface="Arial"/>
+                <a:cs typeface="Arial"/>
+                <a:sym typeface="Arial"/>
+              </a:defRPr>
+            </a:lvl5pPr>
+            <a:lvl6pPr marR="0" lvl="5" algn="l" rtl="0">
+              <a:lnSpc>
+                <a:spcPct val="100000"/>
+              </a:lnSpc>
+              <a:spcBef>
+                <a:spcPts val="0"/>
+              </a:spcBef>
+              <a:spcAft>
+                <a:spcPts val="0"/>
+              </a:spcAft>
+              <a:buClr>
+                <a:srgbClr val="000000"/>
+              </a:buClr>
+              <a:buFont typeface="Arial"/>
+              <a:defRPr sz="1400" b="0" i="0" u="none" strike="noStrike" cap="none">
+                <a:solidFill>
+                  <a:srgbClr val="000000"/>
+                </a:solidFill>
+                <a:latin typeface="Arial"/>
+                <a:ea typeface="Arial"/>
+                <a:cs typeface="Arial"/>
+                <a:sym typeface="Arial"/>
+              </a:defRPr>
+            </a:lvl6pPr>
+            <a:lvl7pPr marR="0" lvl="6" algn="l" rtl="0">
+              <a:lnSpc>
+                <a:spcPct val="100000"/>
+              </a:lnSpc>
+              <a:spcBef>
+                <a:spcPts val="0"/>
+              </a:spcBef>
+              <a:spcAft>
+                <a:spcPts val="0"/>
+              </a:spcAft>
+              <a:buClr>
+                <a:srgbClr val="000000"/>
+              </a:buClr>
+              <a:buFont typeface="Arial"/>
+              <a:defRPr sz="1400" b="0" i="0" u="none" strike="noStrike" cap="none">
+                <a:solidFill>
+                  <a:srgbClr val="000000"/>
+                </a:solidFill>
+                <a:latin typeface="Arial"/>
+                <a:ea typeface="Arial"/>
+                <a:cs typeface="Arial"/>
+                <a:sym typeface="Arial"/>
+              </a:defRPr>
+            </a:lvl7pPr>
+            <a:lvl8pPr marR="0" lvl="7" algn="l" rtl="0">
+              <a:lnSpc>
+                <a:spcPct val="100000"/>
+              </a:lnSpc>
+              <a:spcBef>
+                <a:spcPts val="0"/>
+              </a:spcBef>
+              <a:spcAft>
+                <a:spcPts val="0"/>
+              </a:spcAft>
+              <a:buClr>
+                <a:srgbClr val="000000"/>
+              </a:buClr>
+              <a:buFont typeface="Arial"/>
+              <a:defRPr sz="1400" b="0" i="0" u="none" strike="noStrike" cap="none">
+                <a:solidFill>
+                  <a:srgbClr val="000000"/>
+                </a:solidFill>
+                <a:latin typeface="Arial"/>
+                <a:ea typeface="Arial"/>
+                <a:cs typeface="Arial"/>
+                <a:sym typeface="Arial"/>
+              </a:defRPr>
+            </a:lvl8pPr>
+            <a:lvl9pPr marR="0" lvl="8" algn="l" rtl="0">
+              <a:lnSpc>
+                <a:spcPct val="100000"/>
+              </a:lnSpc>
+              <a:spcBef>
+                <a:spcPts val="0"/>
+              </a:spcBef>
+              <a:spcAft>
+                <a:spcPts val="0"/>
+              </a:spcAft>
+              <a:buClr>
+                <a:srgbClr val="000000"/>
+              </a:buClr>
+              <a:buFont typeface="Arial"/>
+              <a:defRPr sz="1400" b="0" i="0" u="none" strike="noStrike" cap="none">
+                <a:solidFill>
+                  <a:srgbClr val="000000"/>
+                </a:solidFill>
+                <a:latin typeface="Arial"/>
+                <a:ea typeface="Arial"/>
+                <a:cs typeface="Arial"/>
+                <a:sym typeface="Arial"/>
+              </a:defRPr>
+            </a:lvl9pPr>
+          </a:lstStyle>
+          <a:p>
+            <a:r>
+              <a:rPr lang="en-GB" sz="5400" dirty="0">
+                <a:solidFill>
+                  <a:schemeClr val="tx1"/>
+                </a:solidFill>
+              </a:rPr>
+              <a:t>Computing Technology</a:t>
+            </a:r>
+          </a:p>
+        </p:txBody>
+      </p:sp>
     </p:spTree>
   </p:cSld>
   <p:clrMapOvr>
     <a:masterClrMapping/>
   </p:clrMapOvr>
-</p:sld>
-</file>
-
-<file path=ppt/slides/slide117.xml><?xml version="1.0" encoding="utf-8"?>
-<p:sld xmlns:a="http://schemas.openxmlformats.org/drawingml/2006/main" xmlns:r="http://schemas.openxmlformats.org/officeDocument/2006/relationships" xmlns:p="http://schemas.openxmlformats.org/presentationml/2006/main">
-  <p:cSld>
-    <p:spTree>
-      <p:nvGrpSpPr>
-        <p:cNvPr id="1" name="Shape 689"/>
-        <p:cNvGrpSpPr/>
-        <p:nvPr/>
-      </p:nvGrpSpPr>
-      <p:grpSpPr>
-        <a:xfrm>
-          <a:off x="0" y="0"/>
-          <a:ext cx="0" cy="0"/>
-          <a:chOff x="0" y="0"/>
-          <a:chExt cx="0" cy="0"/>
-        </a:xfrm>
-      </p:grpSpPr>
-      <p:pic>
-        <p:nvPicPr>
-          <p:cNvPr id="690" name="Google Shape;690;p129" descr="Music by Fesliyan Studios - Silly Chicken&#10;&#10;***&#10;&#10;This is CS50, Harvard University's introduction to the intellectual enterprises of computer science and the art of programming.&#10;&#10;***&#10;&#10;HOW TO SUBSCRIBE&#10;&#10;http://www.youtube.com/subscription_center?add_user=cs50tv&#10;&#10;HOW TO TAKE CS50&#10;&#10;edX: https://cs50.edx.org/&#10;Harvard Extension School: https://cs50.harvard.edu/extension&#10;Harvard Summer School: https://cs50.harvard.edu/summer&#10;OpenCourseWare: https://cs50.harvard.edu/x&#10;&#10;HOW TO JOIN CS50 COMMUNITIES&#10;&#10;Discord: https://discord.gg/T8QZqRx&#10;Ed: https://cs50.harvard.edu/x/ed&#10;Facebook Group: https://www.facebook.com/groups/cs50/&#10;Faceboook Page: https://www.facebook.com/cs50/&#10;GitHub: https://github.com/cs50&#10;Gitter: https://gitter.im/cs50/x&#10;Instagram: https://instagram.com/cs50&#10;LinkedIn Group: https://www.linkedin.com/groups/7437240/&#10;LinkedIn Page: https://www.linkedin.com/school/cs50/&#10;Quora: https://www.quora.com/topic/CS50&#10;Slack: https://cs50.edx.org/slack&#10;Snapchat: https://www.snapchat.com/add/cs50&#10;Twitter: https://twitter.com/cs50&#10;YouTube: http://www.youtube.com/cs50&#10;&#10;HOW TO FOLLOW DAVID J. MALAN&#10;&#10;Facebook: https://www.facebook.com/dmalan&#10;GitHub: https://github.com/dmalan&#10;Instagram: https://www.instagram.com/davidjmalan/&#10;LinkedIn: https://www.linkedin.com/in/malan/&#10;Quora: https://www.quora.com/profile/David-J-Malan&#10;Twitter: https://twitter.com/davidjmalan&#10;&#10;***&#10;&#10;CS50 SHOP&#10;&#10;https://cs50.harvardshop.com/&#10;&#10;***&#10;&#10;LICENSE&#10;&#10;CC BY-NC-SA 4.0&#10;Creative Commons Attribution-NonCommercial-ShareAlike 4.0 International Public License&#10;https://creativecommons.org/licenses/by-nc-sa/4.0/&#10;&#10;David J. Malan&#10;https://cs.harvard.edu/malan&#10;malan@harvard.edu" title="Passing TCP/IP Packets - Outtakes - CS50 2020">
-            <a:hlinkClick r:id="rId3"/>
-          </p:cNvPr>
-          <p:cNvPicPr preferRelativeResize="0"/>
-          <p:nvPr/>
-        </p:nvPicPr>
-        <p:blipFill>
-          <a:blip r:embed="rId4">
-            <a:alphaModFix/>
-          </a:blip>
-          <a:stretch>
-            <a:fillRect/>
-          </a:stretch>
-        </p:blipFill>
-        <p:spPr>
-          <a:xfrm>
-            <a:off x="0" y="-857250"/>
-            <a:ext cx="9144000" cy="6858000"/>
-          </a:xfrm>
-          <a:prstGeom prst="rect">
-            <a:avLst/>
-          </a:prstGeom>
-          <a:noFill/>
-          <a:ln>
-            <a:noFill/>
-          </a:ln>
-        </p:spPr>
-      </p:pic>
-    </p:spTree>
-  </p:cSld>
-  <p:clrMapOvr>
-    <a:masterClrMapping/>
-  </p:clrMapOvr>
-  <p:timing>
-    <p:tnLst>
-      <p:par>
-        <p:cTn id="1" dur="indefinite" restart="never" nodeType="tmRoot">
-          <p:childTnLst>
-            <p:seq concurrent="1" nextAc="seek">
-              <p:cTn id="2" dur="indefinite" nodeType="mainSeq">
-                <p:childTnLst>
-                  <p:par>
-                    <p:cTn id="3" fill="hold">
-                      <p:stCondLst>
-                        <p:cond delay="indefinite"/>
-                      </p:stCondLst>
-                      <p:childTnLst>
-                        <p:par>
-                          <p:cTn id="4" fill="hold">
-                            <p:stCondLst>
-                              <p:cond delay="0"/>
-                            </p:stCondLst>
-                            <p:childTnLst>
-                              <p:par>
-                                <p:cTn id="5" presetID="10" presetClass="entr" presetSubtype="0" fill="hold" nodeType="clickEffect">
-                                  <p:stCondLst>
-                                    <p:cond delay="0"/>
-                                  </p:stCondLst>
-                                  <p:childTnLst>
-                                    <p:set>
-                                      <p:cBhvr>
-                                        <p:cTn id="6" dur="1" fill="hold">
-                                          <p:stCondLst>
-                                            <p:cond delay="0"/>
-                                          </p:stCondLst>
-                                        </p:cTn>
-                                        <p:tgtEl>
-                                          <p:spTgt spid="690"/>
-                                        </p:tgtEl>
-                                        <p:attrNameLst>
-                                          <p:attrName>style.visibility</p:attrName>
-                                        </p:attrNameLst>
-                                      </p:cBhvr>
-                                      <p:to>
-                                        <p:strVal val="visible"/>
-                                      </p:to>
-                                    </p:set>
-                                    <p:animEffect transition="in" filter="fade">
-                                      <p:cBhvr>
-                                        <p:cTn id="7" dur="1000"/>
-                                        <p:tgtEl>
-                                          <p:spTgt spid="690"/>
-                                        </p:tgtEl>
-                                      </p:cBhvr>
-                                    </p:animEffect>
-                                  </p:childTnLst>
-                                </p:cTn>
-                              </p:par>
-                            </p:childTnLst>
-                          </p:cTn>
-                        </p:par>
-                      </p:childTnLst>
-                    </p:cTn>
-                  </p:par>
-                </p:childTnLst>
-              </p:cTn>
-              <p:prevCondLst>
-                <p:cond evt="onPrev" delay="0">
-                  <p:tgtEl>
-                    <p:sldTgt/>
-                  </p:tgtEl>
-                </p:cond>
-              </p:prevCondLst>
-              <p:nextCondLst>
-                <p:cond evt="onNext" delay="0">
-                  <p:tgtEl>
-                    <p:sldTgt/>
-                  </p:tgtEl>
-                </p:cond>
-              </p:nextCondLst>
-            </p:seq>
-          </p:childTnLst>
-        </p:cTn>
-      </p:par>
-    </p:tnLst>
-  </p:timing>
 </p:sld>
 </file>
 
@@ -25879,7 +25863,7 @@
         </p:nvGraphicFramePr>
         <p:xfrm>
           <a:off x="952500" y="788800"/>
-          <a:ext cx="3000000" cy="3000000"/>
+          <a:ext cx="7239000" cy="3565890"/>
         </p:xfrm>
         <a:graphic>
           <a:graphicData uri="http://schemas.openxmlformats.org/drawingml/2006/table">
@@ -27204,7 +27188,7 @@
         </p:nvGraphicFramePr>
         <p:xfrm>
           <a:off x="952500" y="788800"/>
-          <a:ext cx="3000000" cy="3000000"/>
+          <a:ext cx="7239000" cy="3565890"/>
         </p:xfrm>
         <a:graphic>
           <a:graphicData uri="http://schemas.openxmlformats.org/drawingml/2006/table">
@@ -28529,7 +28513,7 @@
         </p:nvSpPr>
         <p:spPr>
           <a:xfrm>
-            <a:off x="311700" y="2150850"/>
+            <a:off x="311700" y="896816"/>
             <a:ext cx="8520600" cy="841800"/>
           </a:xfrm>
           <a:prstGeom prst="rect">
@@ -28552,10 +28536,10 @@
               <a:buNone/>
             </a:pPr>
             <a:r>
-              <a:rPr lang="en"/>
-              <a:t>souvenir photo</a:t>
-            </a:r>
-            <a:endParaRPr/>
+              <a:rPr lang="en" dirty="0"/>
+              <a:t>Announcements</a:t>
+            </a:r>
+            <a:endParaRPr dirty="0"/>
           </a:p>
         </p:txBody>
       </p:sp>

</xml_diff>